<commit_message>
update documentation with new-user orientation
</commit_message>
<xml_diff>
--- a/Intro to Behavioral Data Harmonization with the NDA for Redcap and Box users.pptx
+++ b/Intro to Behavioral Data Harmonization with the NDA for Redcap and Box users.pptx
@@ -113,6 +113,11 @@
       </a:defRPr>
     </a:lvl9pPr>
   </p:defaultTextStyle>
+  <p:extLst>
+    <p:ext uri="{EFAFB233-063F-42B5-8137-9DF3F51BA10A}">
+      <p15:sldGuideLst xmlns:p15="http://schemas.microsoft.com/office/powerpoint/2012/main"/>
+    </p:ext>
+  </p:extLst>
 </p:presentation>
 </file>
 
@@ -263,7 +268,7 @@
           <a:p>
             <a:fld id="{578B035F-9680-4017-9DEF-D46273758CF5}" type="datetimeFigureOut">
               <a:rPr lang="en-US" smtClean="0"/>
-              <a:t>5/11/2020</a:t>
+              <a:t>5/14/2020</a:t>
             </a:fld>
             <a:endParaRPr lang="en-US"/>
           </a:p>
@@ -461,7 +466,7 @@
           <a:p>
             <a:fld id="{578B035F-9680-4017-9DEF-D46273758CF5}" type="datetimeFigureOut">
               <a:rPr lang="en-US" smtClean="0"/>
-              <a:t>5/11/2020</a:t>
+              <a:t>5/14/2020</a:t>
             </a:fld>
             <a:endParaRPr lang="en-US"/>
           </a:p>
@@ -669,7 +674,7 @@
           <a:p>
             <a:fld id="{578B035F-9680-4017-9DEF-D46273758CF5}" type="datetimeFigureOut">
               <a:rPr lang="en-US" smtClean="0"/>
-              <a:t>5/11/2020</a:t>
+              <a:t>5/14/2020</a:t>
             </a:fld>
             <a:endParaRPr lang="en-US"/>
           </a:p>
@@ -867,7 +872,7 @@
           <a:p>
             <a:fld id="{578B035F-9680-4017-9DEF-D46273758CF5}" type="datetimeFigureOut">
               <a:rPr lang="en-US" smtClean="0"/>
-              <a:t>5/11/2020</a:t>
+              <a:t>5/14/2020</a:t>
             </a:fld>
             <a:endParaRPr lang="en-US"/>
           </a:p>
@@ -1142,7 +1147,7 @@
           <a:p>
             <a:fld id="{578B035F-9680-4017-9DEF-D46273758CF5}" type="datetimeFigureOut">
               <a:rPr lang="en-US" smtClean="0"/>
-              <a:t>5/11/2020</a:t>
+              <a:t>5/14/2020</a:t>
             </a:fld>
             <a:endParaRPr lang="en-US"/>
           </a:p>
@@ -1407,7 +1412,7 @@
           <a:p>
             <a:fld id="{578B035F-9680-4017-9DEF-D46273758CF5}" type="datetimeFigureOut">
               <a:rPr lang="en-US" smtClean="0"/>
-              <a:t>5/11/2020</a:t>
+              <a:t>5/14/2020</a:t>
             </a:fld>
             <a:endParaRPr lang="en-US"/>
           </a:p>
@@ -1819,7 +1824,7 @@
           <a:p>
             <a:fld id="{578B035F-9680-4017-9DEF-D46273758CF5}" type="datetimeFigureOut">
               <a:rPr lang="en-US" smtClean="0"/>
-              <a:t>5/11/2020</a:t>
+              <a:t>5/14/2020</a:t>
             </a:fld>
             <a:endParaRPr lang="en-US"/>
           </a:p>
@@ -1960,7 +1965,7 @@
           <a:p>
             <a:fld id="{578B035F-9680-4017-9DEF-D46273758CF5}" type="datetimeFigureOut">
               <a:rPr lang="en-US" smtClean="0"/>
-              <a:t>5/11/2020</a:t>
+              <a:t>5/14/2020</a:t>
             </a:fld>
             <a:endParaRPr lang="en-US"/>
           </a:p>
@@ -2073,7 +2078,7 @@
           <a:p>
             <a:fld id="{578B035F-9680-4017-9DEF-D46273758CF5}" type="datetimeFigureOut">
               <a:rPr lang="en-US" smtClean="0"/>
-              <a:t>5/11/2020</a:t>
+              <a:t>5/14/2020</a:t>
             </a:fld>
             <a:endParaRPr lang="en-US"/>
           </a:p>
@@ -2384,7 +2389,7 @@
           <a:p>
             <a:fld id="{578B035F-9680-4017-9DEF-D46273758CF5}" type="datetimeFigureOut">
               <a:rPr lang="en-US" smtClean="0"/>
-              <a:t>5/11/2020</a:t>
+              <a:t>5/14/2020</a:t>
             </a:fld>
             <a:endParaRPr lang="en-US"/>
           </a:p>
@@ -2672,7 +2677,7 @@
           <a:p>
             <a:fld id="{578B035F-9680-4017-9DEF-D46273758CF5}" type="datetimeFigureOut">
               <a:rPr lang="en-US" smtClean="0"/>
-              <a:t>5/11/2020</a:t>
+              <a:t>5/14/2020</a:t>
             </a:fld>
             <a:endParaRPr lang="en-US"/>
           </a:p>
@@ -2913,7 +2918,7 @@
           <a:p>
             <a:fld id="{578B035F-9680-4017-9DEF-D46273758CF5}" type="datetimeFigureOut">
               <a:rPr lang="en-US" smtClean="0"/>
-              <a:t>5/11/2020</a:t>
+              <a:t>5/14/2020</a:t>
             </a:fld>
             <a:endParaRPr lang="en-US"/>
           </a:p>
@@ -3348,7 +3353,7 @@
         </p:nvSpPr>
         <p:spPr>
           <a:xfrm>
-            <a:off x="1523999" y="1365250"/>
+            <a:off x="1214437" y="2986232"/>
             <a:ext cx="9763125" cy="2387600"/>
           </a:xfrm>
         </p:spPr>
@@ -3361,6 +3366,22 @@
             <a:r>
               <a:rPr lang="en-US" dirty="0"/>
               <a:t>Introduction to Harmonizing your study’s Behavioral Data with the data dictionary at the NDA</a:t>
+            </a:r>
+            <a:br>
+              <a:rPr lang="en-US" dirty="0"/>
+            </a:br>
+            <a:r>
+              <a:rPr lang="en-US" dirty="0">
+                <a:hlinkClick r:id="rId2"/>
+              </a:rPr>
+              <a:t>plenzini@wustl.edu</a:t>
+            </a:r>
+            <a:br>
+              <a:rPr lang="en-US" dirty="0"/>
+            </a:br>
+            <a:r>
+              <a:rPr lang="en-US" dirty="0"/>
+              <a:t>5/14/2020</a:t>
             </a:r>
           </a:p>
         </p:txBody>
@@ -3413,7 +3434,7 @@
         </p:nvSpPr>
         <p:spPr>
           <a:xfrm>
-            <a:off x="838200" y="931104"/>
+            <a:off x="838200" y="536249"/>
             <a:ext cx="10515600" cy="4351338"/>
           </a:xfrm>
         </p:spPr>
@@ -3505,6 +3526,41 @@
             <a:r>
               <a:rPr lang="en-US" dirty="0"/>
               <a:t>https://github.com/humanconnectome/NIHToolbox2NDA</a:t>
+            </a:r>
+          </a:p>
+        </p:txBody>
+      </p:sp>
+      <p:sp>
+        <p:nvSpPr>
+          <p:cNvPr id="2" name="TextBox 1">
+            <a:extLst>
+              <a:ext uri="{FF2B5EF4-FFF2-40B4-BE49-F238E27FC236}">
+                <a16:creationId xmlns:a16="http://schemas.microsoft.com/office/drawing/2014/main" id="{F032D58C-2741-4D8D-8430-2C8E74BF0851}"/>
+              </a:ext>
+            </a:extLst>
+          </p:cNvPr>
+          <p:cNvSpPr txBox="1"/>
+          <p:nvPr/>
+        </p:nvSpPr>
+        <p:spPr>
+          <a:xfrm>
+            <a:off x="838200" y="4936756"/>
+            <a:ext cx="10515600" cy="1384995"/>
+          </a:xfrm>
+          <a:prstGeom prst="rect">
+            <a:avLst/>
+          </a:prstGeom>
+          <a:noFill/>
+        </p:spPr>
+        <p:txBody>
+          <a:bodyPr wrap="square" rtlCol="0">
+            <a:spAutoFit/>
+          </a:bodyPr>
+          <a:lstStyle/>
+          <a:p>
+            <a:r>
+              <a:rPr lang="en-US" sz="2800" dirty="0"/>
+              <a:t>TIME SENSITIVE:  Make sure the person responsible for submitting data to the NDA has the appropriate permissions to do so.  Initiate requests to administrators early to avoid delays.</a:t>
             </a:r>
           </a:p>
         </p:txBody>

</xml_diff>